<commit_message>
add phenotype EQ model
</commit_message>
<xml_diff>
--- a/docs/developer/phenotype/Phenotype_cs3.pptx
+++ b/docs/developer/phenotype/Phenotype_cs3.pptx
@@ -1,6 +1,6 @@
 
 <file path=ppt/presentation.xml><?xml version="1.0" encoding="utf-8"?>
-<p:presentation xmlns:a="http://schemas.openxmlformats.org/drawingml/2006/main" xmlns:r="http://schemas.openxmlformats.org/officeDocument/2006/relationships" xmlns:mc="http://schemas.openxmlformats.org/markup-compatibility/2006" xmlns:mv="urn:schemas-microsoft-com:mac:vml" xmlns:p="http://schemas.openxmlformats.org/presentationml/2006/main" mc:Ignorable="mv" mc:PreserveAttributes="mv:*" saveSubsetFonts="1">
+<p:presentation xmlns:a="http://schemas.openxmlformats.org/drawingml/2006/main" xmlns:r="http://schemas.openxmlformats.org/officeDocument/2006/relationships" xmlns:p="http://schemas.openxmlformats.org/presentationml/2006/main" saveSubsetFonts="1">
   <p:sldMasterIdLst>
     <p:sldMasterId id="2147483648" r:id="rId1"/>
   </p:sldMasterIdLst>
@@ -112,7 +112,7 @@
 </file>
 
 <file path=ppt/slideLayouts/slideLayout1.xml><?xml version="1.0" encoding="utf-8"?>
-<p:sldLayout xmlns:a="http://schemas.openxmlformats.org/drawingml/2006/main" xmlns:r="http://schemas.openxmlformats.org/officeDocument/2006/relationships" xmlns:mc="http://schemas.openxmlformats.org/markup-compatibility/2006" xmlns:mv="urn:schemas-microsoft-com:mac:vml" xmlns:p="http://schemas.openxmlformats.org/presentationml/2006/main" mc:Ignorable="mv" mc:PreserveAttributes="mv:*" type="title" preserve="1">
+<p:sldLayout xmlns:a="http://schemas.openxmlformats.org/drawingml/2006/main" xmlns:r="http://schemas.openxmlformats.org/officeDocument/2006/relationships" xmlns:p="http://schemas.openxmlformats.org/presentationml/2006/main" type="title" preserve="1">
   <p:cSld name="Title Slide">
     <p:spTree>
       <p:nvGrpSpPr>
@@ -293,7 +293,7 @@
             <a:fld id="{443089B1-5681-455E-8E07-8E588D78827F}" type="datetimeFigureOut">
               <a:rPr lang="en-US" smtClean="0"/>
               <a:pPr/>
-              <a:t>10/31/11</a:t>
+              <a:t>1/30/2012</a:t>
             </a:fld>
             <a:endParaRPr lang="en-US"/>
           </a:p>
@@ -351,7 +351,7 @@
 </file>
 
 <file path=ppt/slideLayouts/slideLayout10.xml><?xml version="1.0" encoding="utf-8"?>
-<p:sldLayout xmlns:a="http://schemas.openxmlformats.org/drawingml/2006/main" xmlns:r="http://schemas.openxmlformats.org/officeDocument/2006/relationships" xmlns:mc="http://schemas.openxmlformats.org/markup-compatibility/2006" xmlns:mv="urn:schemas-microsoft-com:mac:vml" xmlns:p="http://schemas.openxmlformats.org/presentationml/2006/main" mc:Ignorable="mv" mc:PreserveAttributes="mv:*" type="vertTx" preserve="1">
+<p:sldLayout xmlns:a="http://schemas.openxmlformats.org/drawingml/2006/main" xmlns:r="http://schemas.openxmlformats.org/officeDocument/2006/relationships" xmlns:p="http://schemas.openxmlformats.org/presentationml/2006/main" type="vertTx" preserve="1">
   <p:cSld name="Title and Vertical Text">
     <p:spTree>
       <p:nvGrpSpPr>
@@ -460,7 +460,7 @@
             <a:fld id="{443089B1-5681-455E-8E07-8E588D78827F}" type="datetimeFigureOut">
               <a:rPr lang="en-US" smtClean="0"/>
               <a:pPr/>
-              <a:t>10/31/11</a:t>
+              <a:t>1/30/2012</a:t>
             </a:fld>
             <a:endParaRPr lang="en-US"/>
           </a:p>
@@ -518,7 +518,7 @@
 </file>
 
 <file path=ppt/slideLayouts/slideLayout11.xml><?xml version="1.0" encoding="utf-8"?>
-<p:sldLayout xmlns:a="http://schemas.openxmlformats.org/drawingml/2006/main" xmlns:r="http://schemas.openxmlformats.org/officeDocument/2006/relationships" xmlns:mc="http://schemas.openxmlformats.org/markup-compatibility/2006" xmlns:mv="urn:schemas-microsoft-com:mac:vml" xmlns:p="http://schemas.openxmlformats.org/presentationml/2006/main" mc:Ignorable="mv" mc:PreserveAttributes="mv:*" type="vertTitleAndTx" preserve="1">
+<p:sldLayout xmlns:a="http://schemas.openxmlformats.org/drawingml/2006/main" xmlns:r="http://schemas.openxmlformats.org/officeDocument/2006/relationships" xmlns:p="http://schemas.openxmlformats.org/presentationml/2006/main" type="vertTitleAndTx" preserve="1">
   <p:cSld name="Vertical Title and Text">
     <p:spTree>
       <p:nvGrpSpPr>
@@ -637,7 +637,7 @@
             <a:fld id="{443089B1-5681-455E-8E07-8E588D78827F}" type="datetimeFigureOut">
               <a:rPr lang="en-US" smtClean="0"/>
               <a:pPr/>
-              <a:t>10/31/11</a:t>
+              <a:t>1/30/2012</a:t>
             </a:fld>
             <a:endParaRPr lang="en-US"/>
           </a:p>
@@ -695,7 +695,7 @@
 </file>
 
 <file path=ppt/slideLayouts/slideLayout2.xml><?xml version="1.0" encoding="utf-8"?>
-<p:sldLayout xmlns:a="http://schemas.openxmlformats.org/drawingml/2006/main" xmlns:r="http://schemas.openxmlformats.org/officeDocument/2006/relationships" xmlns:mc="http://schemas.openxmlformats.org/markup-compatibility/2006" xmlns:mv="urn:schemas-microsoft-com:mac:vml" xmlns:p="http://schemas.openxmlformats.org/presentationml/2006/main" mc:Ignorable="mv" mc:PreserveAttributes="mv:*" type="obj" preserve="1">
+<p:sldLayout xmlns:a="http://schemas.openxmlformats.org/drawingml/2006/main" xmlns:r="http://schemas.openxmlformats.org/officeDocument/2006/relationships" xmlns:p="http://schemas.openxmlformats.org/presentationml/2006/main" type="obj" preserve="1">
   <p:cSld name="Title and Content">
     <p:spTree>
       <p:nvGrpSpPr>
@@ -804,7 +804,7 @@
             <a:fld id="{443089B1-5681-455E-8E07-8E588D78827F}" type="datetimeFigureOut">
               <a:rPr lang="en-US" smtClean="0"/>
               <a:pPr/>
-              <a:t>10/31/11</a:t>
+              <a:t>1/30/2012</a:t>
             </a:fld>
             <a:endParaRPr lang="en-US"/>
           </a:p>
@@ -862,7 +862,7 @@
 </file>
 
 <file path=ppt/slideLayouts/slideLayout3.xml><?xml version="1.0" encoding="utf-8"?>
-<p:sldLayout xmlns:a="http://schemas.openxmlformats.org/drawingml/2006/main" xmlns:r="http://schemas.openxmlformats.org/officeDocument/2006/relationships" xmlns:mc="http://schemas.openxmlformats.org/markup-compatibility/2006" xmlns:mv="urn:schemas-microsoft-com:mac:vml" xmlns:p="http://schemas.openxmlformats.org/presentationml/2006/main" mc:Ignorable="mv" mc:PreserveAttributes="mv:*" type="secHead" preserve="1">
+<p:sldLayout xmlns:a="http://schemas.openxmlformats.org/drawingml/2006/main" xmlns:r="http://schemas.openxmlformats.org/officeDocument/2006/relationships" xmlns:p="http://schemas.openxmlformats.org/presentationml/2006/main" type="secHead" preserve="1">
   <p:cSld name="Section Header">
     <p:spTree>
       <p:nvGrpSpPr>
@@ -1047,7 +1047,7 @@
             <a:fld id="{443089B1-5681-455E-8E07-8E588D78827F}" type="datetimeFigureOut">
               <a:rPr lang="en-US" smtClean="0"/>
               <a:pPr/>
-              <a:t>10/31/11</a:t>
+              <a:t>1/30/2012</a:t>
             </a:fld>
             <a:endParaRPr lang="en-US"/>
           </a:p>
@@ -1105,7 +1105,7 @@
 </file>
 
 <file path=ppt/slideLayouts/slideLayout4.xml><?xml version="1.0" encoding="utf-8"?>
-<p:sldLayout xmlns:a="http://schemas.openxmlformats.org/drawingml/2006/main" xmlns:r="http://schemas.openxmlformats.org/officeDocument/2006/relationships" xmlns:mc="http://schemas.openxmlformats.org/markup-compatibility/2006" xmlns:mv="urn:schemas-microsoft-com:mac:vml" xmlns:p="http://schemas.openxmlformats.org/presentationml/2006/main" mc:Ignorable="mv" mc:PreserveAttributes="mv:*" type="twoObj" preserve="1">
+<p:sldLayout xmlns:a="http://schemas.openxmlformats.org/drawingml/2006/main" xmlns:r="http://schemas.openxmlformats.org/officeDocument/2006/relationships" xmlns:p="http://schemas.openxmlformats.org/presentationml/2006/main" type="twoObj" preserve="1">
   <p:cSld name="Two Content">
     <p:spTree>
       <p:nvGrpSpPr>
@@ -1332,7 +1332,7 @@
             <a:fld id="{443089B1-5681-455E-8E07-8E588D78827F}" type="datetimeFigureOut">
               <a:rPr lang="en-US" smtClean="0"/>
               <a:pPr/>
-              <a:t>10/31/11</a:t>
+              <a:t>1/30/2012</a:t>
             </a:fld>
             <a:endParaRPr lang="en-US"/>
           </a:p>
@@ -1390,7 +1390,7 @@
 </file>
 
 <file path=ppt/slideLayouts/slideLayout5.xml><?xml version="1.0" encoding="utf-8"?>
-<p:sldLayout xmlns:a="http://schemas.openxmlformats.org/drawingml/2006/main" xmlns:r="http://schemas.openxmlformats.org/officeDocument/2006/relationships" xmlns:mc="http://schemas.openxmlformats.org/markup-compatibility/2006" xmlns:mv="urn:schemas-microsoft-com:mac:vml" xmlns:p="http://schemas.openxmlformats.org/presentationml/2006/main" mc:Ignorable="mv" mc:PreserveAttributes="mv:*" type="twoTxTwoObj" preserve="1">
+<p:sldLayout xmlns:a="http://schemas.openxmlformats.org/drawingml/2006/main" xmlns:r="http://schemas.openxmlformats.org/officeDocument/2006/relationships" xmlns:p="http://schemas.openxmlformats.org/presentationml/2006/main" type="twoTxTwoObj" preserve="1">
   <p:cSld name="Comparison">
     <p:spTree>
       <p:nvGrpSpPr>
@@ -1751,7 +1751,7 @@
             <a:fld id="{443089B1-5681-455E-8E07-8E588D78827F}" type="datetimeFigureOut">
               <a:rPr lang="en-US" smtClean="0"/>
               <a:pPr/>
-              <a:t>10/31/11</a:t>
+              <a:t>1/30/2012</a:t>
             </a:fld>
             <a:endParaRPr lang="en-US"/>
           </a:p>
@@ -1809,7 +1809,7 @@
 </file>
 
 <file path=ppt/slideLayouts/slideLayout6.xml><?xml version="1.0" encoding="utf-8"?>
-<p:sldLayout xmlns:a="http://schemas.openxmlformats.org/drawingml/2006/main" xmlns:r="http://schemas.openxmlformats.org/officeDocument/2006/relationships" xmlns:mc="http://schemas.openxmlformats.org/markup-compatibility/2006" xmlns:mv="urn:schemas-microsoft-com:mac:vml" xmlns:p="http://schemas.openxmlformats.org/presentationml/2006/main" mc:Ignorable="mv" mc:PreserveAttributes="mv:*" type="titleOnly" preserve="1">
+<p:sldLayout xmlns:a="http://schemas.openxmlformats.org/drawingml/2006/main" xmlns:r="http://schemas.openxmlformats.org/officeDocument/2006/relationships" xmlns:p="http://schemas.openxmlformats.org/presentationml/2006/main" type="titleOnly" preserve="1">
   <p:cSld name="Title Only">
     <p:spTree>
       <p:nvGrpSpPr>
@@ -1866,7 +1866,7 @@
             <a:fld id="{443089B1-5681-455E-8E07-8E588D78827F}" type="datetimeFigureOut">
               <a:rPr lang="en-US" smtClean="0"/>
               <a:pPr/>
-              <a:t>10/31/11</a:t>
+              <a:t>1/30/2012</a:t>
             </a:fld>
             <a:endParaRPr lang="en-US"/>
           </a:p>
@@ -1924,7 +1924,7 @@
 </file>
 
 <file path=ppt/slideLayouts/slideLayout7.xml><?xml version="1.0" encoding="utf-8"?>
-<p:sldLayout xmlns:a="http://schemas.openxmlformats.org/drawingml/2006/main" xmlns:r="http://schemas.openxmlformats.org/officeDocument/2006/relationships" xmlns:mc="http://schemas.openxmlformats.org/markup-compatibility/2006" xmlns:mv="urn:schemas-microsoft-com:mac:vml" xmlns:p="http://schemas.openxmlformats.org/presentationml/2006/main" mc:Ignorable="mv" mc:PreserveAttributes="mv:*" type="blank" preserve="1">
+<p:sldLayout xmlns:a="http://schemas.openxmlformats.org/drawingml/2006/main" xmlns:r="http://schemas.openxmlformats.org/officeDocument/2006/relationships" xmlns:p="http://schemas.openxmlformats.org/presentationml/2006/main" type="blank" preserve="1">
   <p:cSld name="Blank">
     <p:spTree>
       <p:nvGrpSpPr>
@@ -1958,7 +1958,7 @@
             <a:fld id="{443089B1-5681-455E-8E07-8E588D78827F}" type="datetimeFigureOut">
               <a:rPr lang="en-US" smtClean="0"/>
               <a:pPr/>
-              <a:t>10/31/11</a:t>
+              <a:t>1/30/2012</a:t>
             </a:fld>
             <a:endParaRPr lang="en-US"/>
           </a:p>
@@ -2016,7 +2016,7 @@
 </file>
 
 <file path=ppt/slideLayouts/slideLayout8.xml><?xml version="1.0" encoding="utf-8"?>
-<p:sldLayout xmlns:a="http://schemas.openxmlformats.org/drawingml/2006/main" xmlns:r="http://schemas.openxmlformats.org/officeDocument/2006/relationships" xmlns:mc="http://schemas.openxmlformats.org/markup-compatibility/2006" xmlns:mv="urn:schemas-microsoft-com:mac:vml" xmlns:p="http://schemas.openxmlformats.org/presentationml/2006/main" mc:Ignorable="mv" mc:PreserveAttributes="mv:*" type="objTx" preserve="1">
+<p:sldLayout xmlns:a="http://schemas.openxmlformats.org/drawingml/2006/main" xmlns:r="http://schemas.openxmlformats.org/officeDocument/2006/relationships" xmlns:p="http://schemas.openxmlformats.org/presentationml/2006/main" type="objTx" preserve="1">
   <p:cSld name="Content with Caption">
     <p:spTree>
       <p:nvGrpSpPr>
@@ -2232,7 +2232,7 @@
             <a:fld id="{443089B1-5681-455E-8E07-8E588D78827F}" type="datetimeFigureOut">
               <a:rPr lang="en-US" smtClean="0"/>
               <a:pPr/>
-              <a:t>10/31/11</a:t>
+              <a:t>1/30/2012</a:t>
             </a:fld>
             <a:endParaRPr lang="en-US"/>
           </a:p>
@@ -2290,7 +2290,7 @@
 </file>
 
 <file path=ppt/slideLayouts/slideLayout9.xml><?xml version="1.0" encoding="utf-8"?>
-<p:sldLayout xmlns:a="http://schemas.openxmlformats.org/drawingml/2006/main" xmlns:r="http://schemas.openxmlformats.org/officeDocument/2006/relationships" xmlns:mc="http://schemas.openxmlformats.org/markup-compatibility/2006" xmlns:mv="urn:schemas-microsoft-com:mac:vml" xmlns:p="http://schemas.openxmlformats.org/presentationml/2006/main" mc:Ignorable="mv" mc:PreserveAttributes="mv:*" type="picTx" preserve="1">
+<p:sldLayout xmlns:a="http://schemas.openxmlformats.org/drawingml/2006/main" xmlns:r="http://schemas.openxmlformats.org/officeDocument/2006/relationships" xmlns:p="http://schemas.openxmlformats.org/presentationml/2006/main" type="picTx" preserve="1">
   <p:cSld name="Picture with Caption">
     <p:spTree>
       <p:nvGrpSpPr>
@@ -2482,7 +2482,7 @@
             <a:fld id="{443089B1-5681-455E-8E07-8E588D78827F}" type="datetimeFigureOut">
               <a:rPr lang="en-US" smtClean="0"/>
               <a:pPr/>
-              <a:t>10/31/11</a:t>
+              <a:t>1/30/2012</a:t>
             </a:fld>
             <a:endParaRPr lang="en-US"/>
           </a:p>
@@ -2540,7 +2540,7 @@
 </file>
 
 <file path=ppt/slideMasters/slideMaster1.xml><?xml version="1.0" encoding="utf-8"?>
-<p:sldMaster xmlns:a="http://schemas.openxmlformats.org/drawingml/2006/main" xmlns:r="http://schemas.openxmlformats.org/officeDocument/2006/relationships" xmlns:mc="http://schemas.openxmlformats.org/markup-compatibility/2006" xmlns:mv="urn:schemas-microsoft-com:mac:vml" xmlns:p="http://schemas.openxmlformats.org/presentationml/2006/main" mc:Ignorable="mv" mc:PreserveAttributes="mv:*">
+<p:sldMaster xmlns:a="http://schemas.openxmlformats.org/drawingml/2006/main" xmlns:r="http://schemas.openxmlformats.org/officeDocument/2006/relationships" xmlns:p="http://schemas.openxmlformats.org/presentationml/2006/main">
   <p:cSld>
     <p:bg>
       <p:bgRef idx="1001">
@@ -2692,7 +2692,7 @@
             <a:fld id="{443089B1-5681-455E-8E07-8E588D78827F}" type="datetimeFigureOut">
               <a:rPr lang="en-US" smtClean="0"/>
               <a:pPr/>
-              <a:t>10/31/11</a:t>
+              <a:t>1/30/2012</a:t>
             </a:fld>
             <a:endParaRPr lang="en-US"/>
           </a:p>
@@ -3047,7 +3047,7 @@
 </file>
 
 <file path=ppt/slides/slide1.xml><?xml version="1.0" encoding="utf-8"?>
-<p:sld xmlns:a="http://schemas.openxmlformats.org/drawingml/2006/main" xmlns:r="http://schemas.openxmlformats.org/officeDocument/2006/relationships" xmlns:mc="http://schemas.openxmlformats.org/markup-compatibility/2006" xmlns:mv="urn:schemas-microsoft-com:mac:vml" xmlns:p="http://schemas.openxmlformats.org/presentationml/2006/main" mc:Ignorable="mv" mc:PreserveAttributes="mv:*">
+<p:sld xmlns:a="http://schemas.openxmlformats.org/drawingml/2006/main" xmlns:r="http://schemas.openxmlformats.org/officeDocument/2006/relationships" xmlns:p="http://schemas.openxmlformats.org/presentationml/2006/main">
   <p:cSld>
     <p:spTree>
       <p:nvGrpSpPr>
@@ -3148,15 +3148,7 @@
             </a:r>
             <a:r>
               <a:rPr lang="en-US" dirty="0" smtClean="0"/>
-              <a:t> some organism</a:t>
-            </a:r>
-            <a:r>
-              <a:rPr lang="en-US" dirty="0" smtClean="0"/>
-              <a:t>) towards some </a:t>
-            </a:r>
-            <a:r>
-              <a:rPr lang="en-US" dirty="0" smtClean="0"/>
-              <a:t>‘growth environment’</a:t>
+              <a:t> some organism) towards some ‘growth environment’</a:t>
             </a:r>
           </a:p>
           <a:p>
@@ -3165,13 +3157,8 @@
             </a:pPr>
             <a:r>
               <a:rPr lang="en-US" dirty="0" smtClean="0"/>
-              <a:t>- phenotype is the expression of </a:t>
-            </a:r>
-            <a:r>
-              <a:rPr lang="en-US" dirty="0" smtClean="0"/>
-              <a:t>an organism’s genotype in the context of its environment.</a:t>
-            </a:r>
-            <a:endParaRPr lang="en-US" dirty="0" smtClean="0"/>
+              <a:t>- phenotype is the expression of an organism’s genotype in the context of its environment.</a:t>
+            </a:r>
           </a:p>
           <a:p>
             <a:r>
@@ -3217,7 +3204,7 @@
 </file>
 
 <file path=ppt/slides/slide2.xml><?xml version="1.0" encoding="utf-8"?>
-<p:sld xmlns:a="http://schemas.openxmlformats.org/drawingml/2006/main" xmlns:r="http://schemas.openxmlformats.org/officeDocument/2006/relationships" xmlns:mc="http://schemas.openxmlformats.org/markup-compatibility/2006" xmlns:mv="urn:schemas-microsoft-com:mac:vml" xmlns:p="http://schemas.openxmlformats.org/presentationml/2006/main" mc:Ignorable="mv" mc:PreserveAttributes="mv:*">
+<p:sld xmlns:a="http://schemas.openxmlformats.org/drawingml/2006/main" xmlns:r="http://schemas.openxmlformats.org/officeDocument/2006/relationships" xmlns:p="http://schemas.openxmlformats.org/presentationml/2006/main">
   <p:cSld>
     <p:spTree>
       <p:nvGrpSpPr>
@@ -3315,7 +3302,7 @@
 </file>
 
 <file path=ppt/slides/slide3.xml><?xml version="1.0" encoding="utf-8"?>
-<p:sld xmlns:a="http://schemas.openxmlformats.org/drawingml/2006/main" xmlns:r="http://schemas.openxmlformats.org/officeDocument/2006/relationships" xmlns:mc="http://schemas.openxmlformats.org/markup-compatibility/2006" xmlns:mv="urn:schemas-microsoft-com:mac:vml" xmlns:p="http://schemas.openxmlformats.org/presentationml/2006/main" mc:Ignorable="mv" mc:PreserveAttributes="mv:*">
+<p:sld xmlns:a="http://schemas.openxmlformats.org/drawingml/2006/main" xmlns:r="http://schemas.openxmlformats.org/officeDocument/2006/relationships" xmlns:p="http://schemas.openxmlformats.org/presentationml/2006/main">
   <p:cSld>
     <p:spTree>
       <p:nvGrpSpPr>
@@ -3382,27 +3369,18 @@
               <a:rPr lang="en-US" dirty="0" smtClean="0"/>
               <a:t>where the phenotype is a Quality</a:t>
             </a:r>
-            <a:endParaRPr lang="en-US" dirty="0" smtClean="0"/>
           </a:p>
           <a:p>
             <a:pPr lvl="1"/>
             <a:r>
               <a:rPr lang="en-US" dirty="0" smtClean="0"/>
-              <a:t>‘c</a:t>
-            </a:r>
-            <a:r>
-              <a:rPr lang="en-US" dirty="0" smtClean="0"/>
-              <a:t>urved wing’</a:t>
+              <a:t>‘curved wing’</a:t>
             </a:r>
           </a:p>
           <a:p>
             <a:pPr lvl="1">
               <a:buNone/>
             </a:pPr>
-            <a:r>
-              <a:rPr lang="en-US" dirty="0"/>
-              <a:t>	</a:t>
-            </a:r>
             <a:r>
               <a:rPr lang="en-US" dirty="0" err="1" smtClean="0"/>
               <a:t>is_about</a:t>
@@ -3425,10 +3403,6 @@
               <a:buNone/>
             </a:pPr>
             <a:r>
-              <a:rPr lang="en-US" dirty="0"/>
-              <a:t>	</a:t>
-            </a:r>
-            <a:r>
               <a:rPr lang="en-US" dirty="0" err="1" smtClean="0"/>
               <a:t>has_value</a:t>
             </a:r>
@@ -3436,28 +3410,12 @@
               <a:rPr lang="en-US" dirty="0" smtClean="0"/>
               <a:t> curved</a:t>
             </a:r>
-            <a:r>
-              <a:rPr lang="en-US" dirty="0" smtClean="0"/>
-              <a:t> </a:t>
-            </a:r>
           </a:p>
           <a:p>
             <a:pPr lvl="1"/>
             <a:r>
               <a:rPr lang="en-US" dirty="0" smtClean="0"/>
-              <a:t>	</a:t>
-            </a:r>
-            <a:r>
-              <a:rPr lang="en-US" dirty="0" smtClean="0"/>
-              <a:t>based </a:t>
-            </a:r>
-            <a:r>
-              <a:rPr lang="en-US" dirty="0" smtClean="0"/>
-              <a:t>on assay-observation </a:t>
-            </a:r>
-            <a:r>
-              <a:rPr lang="en-US" dirty="0" smtClean="0"/>
-              <a:t>result</a:t>
+              <a:t>based on assay-observation result</a:t>
             </a:r>
           </a:p>
           <a:p>
@@ -3481,35 +3439,18 @@
               <a:rPr lang="en-US" dirty="0" smtClean="0"/>
               <a:t> process)</a:t>
             </a:r>
-            <a:endParaRPr lang="en-US" dirty="0" smtClean="0"/>
           </a:p>
           <a:p>
             <a:pPr lvl="1"/>
             <a:r>
               <a:rPr lang="en-US" dirty="0" smtClean="0"/>
-              <a:t>‘d</a:t>
-            </a:r>
-            <a:r>
-              <a:rPr lang="en-US" dirty="0" smtClean="0"/>
-              <a:t>elayed </a:t>
-            </a:r>
-            <a:r>
-              <a:rPr lang="en-US" dirty="0" smtClean="0"/>
-              <a:t>kidney </a:t>
-            </a:r>
-            <a:r>
-              <a:rPr lang="en-US" dirty="0" smtClean="0"/>
-              <a:t>development’</a:t>
+              <a:t>‘delayed kidney development’</a:t>
             </a:r>
           </a:p>
           <a:p>
             <a:pPr lvl="1">
               <a:buNone/>
             </a:pPr>
-            <a:r>
-              <a:rPr lang="en-US" dirty="0" smtClean="0"/>
-              <a:t>	</a:t>
-            </a:r>
             <a:r>
               <a:rPr lang="en-US" dirty="0" err="1" smtClean="0"/>
               <a:t>is_about</a:t>
@@ -3524,22 +3465,13 @@
             </a:r>
             <a:r>
               <a:rPr lang="en-US" dirty="0" smtClean="0"/>
-              <a:t> some</a:t>
-            </a:r>
-            <a:r>
-              <a:rPr lang="en-US" dirty="0" smtClean="0"/>
-              <a:t> ‘kidney development’)</a:t>
-            </a:r>
-            <a:endParaRPr lang="en-US" dirty="0" smtClean="0"/>
+              <a:t> some ‘kidney development’)</a:t>
+            </a:r>
           </a:p>
           <a:p>
             <a:pPr lvl="1">
               <a:buNone/>
             </a:pPr>
-            <a:r>
-              <a:rPr lang="en-US" dirty="0"/>
-              <a:t>	</a:t>
-            </a:r>
             <a:r>
               <a:rPr lang="en-US" dirty="0" err="1" smtClean="0"/>
               <a:t>has_value</a:t>
@@ -3548,24 +3480,12 @@
               <a:rPr lang="en-US" dirty="0" smtClean="0"/>
               <a:t> delayed</a:t>
             </a:r>
-            <a:r>
-              <a:rPr lang="en-US" dirty="0" smtClean="0"/>
-              <a:t> </a:t>
-            </a:r>
           </a:p>
           <a:p>
             <a:pPr lvl="1"/>
             <a:r>
               <a:rPr lang="en-US" dirty="0" smtClean="0"/>
-              <a:t>based </a:t>
-            </a:r>
-            <a:r>
-              <a:rPr lang="en-US" dirty="0" smtClean="0"/>
-              <a:t>on assay </a:t>
-            </a:r>
-            <a:r>
-              <a:rPr lang="en-US" dirty="0" smtClean="0"/>
-              <a:t>result</a:t>
+              <a:t>based on assay result</a:t>
             </a:r>
           </a:p>
           <a:p>
@@ -3573,31 +3493,18 @@
               <a:rPr lang="en-US" dirty="0" smtClean="0"/>
               <a:t>where the phenotype is Relational quality and is determined by the environment</a:t>
             </a:r>
-            <a:endParaRPr lang="en-US" dirty="0" smtClean="0"/>
           </a:p>
           <a:p>
             <a:pPr lvl="1"/>
             <a:r>
               <a:rPr lang="en-US" dirty="0" smtClean="0"/>
-              <a:t>‘Temperature</a:t>
-            </a:r>
-            <a:r>
-              <a:rPr lang="en-US" dirty="0" smtClean="0"/>
-              <a:t>-dependent cell </a:t>
-            </a:r>
-            <a:r>
-              <a:rPr lang="en-US" dirty="0" smtClean="0"/>
-              <a:t>growth’</a:t>
+              <a:t>‘Temperature-dependent cell growth’</a:t>
             </a:r>
           </a:p>
           <a:p>
             <a:pPr lvl="1">
               <a:buNone/>
             </a:pPr>
-            <a:r>
-              <a:rPr lang="en-US" dirty="0"/>
-              <a:t>	</a:t>
-            </a:r>
             <a:r>
               <a:rPr lang="en-US" dirty="0" err="1" smtClean="0"/>
               <a:t>is_about</a:t>
@@ -3612,59 +3519,27 @@
             </a:r>
             <a:r>
               <a:rPr lang="en-US" dirty="0" smtClean="0"/>
-              <a:t> some</a:t>
-            </a:r>
-            <a:r>
-              <a:rPr lang="en-US" dirty="0" smtClean="0"/>
-              <a:t> ‘cell growth’) towards </a:t>
-            </a:r>
-            <a:r>
-              <a:rPr lang="en-US" dirty="0" smtClean="0"/>
-              <a:t>some</a:t>
-            </a:r>
-            <a:r>
-              <a:rPr lang="en-US" dirty="0" smtClean="0"/>
-              <a:t> ‘growth environment’</a:t>
+              <a:t> some ‘cell growth’) towards some ‘growth environment’</a:t>
             </a:r>
           </a:p>
           <a:p>
             <a:pPr lvl="1">
               <a:buNone/>
             </a:pPr>
-            <a:r>
-              <a:rPr lang="en-US" dirty="0"/>
-              <a:t>	</a:t>
-            </a:r>
             <a:r>
               <a:rPr lang="en-US" dirty="0" err="1" smtClean="0"/>
               <a:t>has_value</a:t>
             </a:r>
             <a:r>
               <a:rPr lang="en-US" dirty="0" smtClean="0"/>
-              <a:t> ‘temperature</a:t>
-            </a:r>
-            <a:r>
-              <a:rPr lang="en-US" dirty="0" smtClean="0"/>
-              <a:t>-</a:t>
-            </a:r>
-            <a:r>
-              <a:rPr lang="en-US" dirty="0" smtClean="0"/>
-              <a:t>dependent’ </a:t>
+              <a:t> ‘temperature-dependent’ </a:t>
             </a:r>
           </a:p>
           <a:p>
             <a:pPr lvl="1"/>
             <a:r>
               <a:rPr lang="en-US" dirty="0" smtClean="0"/>
-              <a:t>based </a:t>
-            </a:r>
-            <a:r>
-              <a:rPr lang="en-US" dirty="0" smtClean="0"/>
-              <a:t>on assay </a:t>
-            </a:r>
-            <a:r>
-              <a:rPr lang="en-US" dirty="0" smtClean="0"/>
-              <a:t>result</a:t>
+              <a:t>based on assay result</a:t>
             </a:r>
             <a:endParaRPr lang="en-US" dirty="0"/>
           </a:p>
@@ -3686,7 +3561,7 @@
 </file>
 
 <file path=ppt/slides/slide4.xml><?xml version="1.0" encoding="utf-8"?>
-<p:sld xmlns:a="http://schemas.openxmlformats.org/drawingml/2006/main" xmlns:r="http://schemas.openxmlformats.org/officeDocument/2006/relationships" xmlns:mc="http://schemas.openxmlformats.org/markup-compatibility/2006" xmlns:mv="urn:schemas-microsoft-com:mac:vml" xmlns:p="http://schemas.openxmlformats.org/presentationml/2006/main" mc:Ignorable="mv" mc:PreserveAttributes="mv:*">
+<p:sld xmlns:a="http://schemas.openxmlformats.org/drawingml/2006/main" xmlns:r="http://schemas.openxmlformats.org/officeDocument/2006/relationships" xmlns:p="http://schemas.openxmlformats.org/presentationml/2006/main">
   <p:cSld>
     <p:spTree>
       <p:nvGrpSpPr>
@@ -3771,49 +3646,13 @@
             <a:pPr lvl="1"/>
             <a:r>
               <a:rPr lang="en-US" dirty="0" smtClean="0"/>
-              <a:t>Qualitative assessment value</a:t>
-            </a:r>
-            <a:r>
-              <a:rPr lang="en-US" dirty="0" smtClean="0"/>
-              <a:t>: </a:t>
-            </a:r>
-            <a:r>
-              <a:rPr lang="en-US" dirty="0" smtClean="0"/>
-              <a:t>increased, decreased, normal, </a:t>
-            </a:r>
-            <a:r>
-              <a:rPr lang="en-US" dirty="0" smtClean="0"/>
-              <a:t>abnormal </a:t>
-            </a:r>
-            <a:r>
-              <a:rPr lang="en-US" dirty="0" smtClean="0"/>
-              <a:t>are</a:t>
-            </a:r>
-            <a:r>
-              <a:rPr lang="en-US" dirty="0" smtClean="0"/>
-              <a:t> </a:t>
-            </a:r>
-            <a:r>
-              <a:rPr lang="en-US" dirty="0" smtClean="0"/>
-              <a:t>examples of</a:t>
-            </a:r>
-            <a:r>
-              <a:rPr lang="en-US" dirty="0" smtClean="0"/>
-              <a:t> </a:t>
-            </a:r>
-            <a:r>
-              <a:rPr lang="en-US" dirty="0" smtClean="0"/>
-              <a:t>instances</a:t>
-            </a:r>
-          </a:p>
-          <a:p>
-            <a:r>
-              <a:rPr lang="en-US" dirty="0" smtClean="0"/>
-              <a:t>Phenotypic </a:t>
-            </a:r>
-            <a:r>
-              <a:rPr lang="en-US" dirty="0" smtClean="0"/>
-              <a:t>information is a</a:t>
+              <a:t>Qualitative assessment value: increased, decreased, normal, abnormal areexamples ofinstances</a:t>
+            </a:r>
+          </a:p>
+          <a:p>
+            <a:r>
+              <a:rPr lang="en-US" dirty="0" smtClean="0"/>
+              <a:t>Phenotypic information is a</a:t>
             </a:r>
           </a:p>
           <a:p>
@@ -3864,7 +3703,7 @@
 </file>
 
 <file path=ppt/slides/slide5.xml><?xml version="1.0" encoding="utf-8"?>
-<p:sld xmlns:a="http://schemas.openxmlformats.org/drawingml/2006/main" xmlns:r="http://schemas.openxmlformats.org/officeDocument/2006/relationships" xmlns:mc="http://schemas.openxmlformats.org/markup-compatibility/2006" xmlns:mv="urn:schemas-microsoft-com:mac:vml" xmlns:p="http://schemas.openxmlformats.org/presentationml/2006/main" mc:Ignorable="mv" mc:PreserveAttributes="mv:*">
+<p:sld xmlns:a="http://schemas.openxmlformats.org/drawingml/2006/main" xmlns:r="http://schemas.openxmlformats.org/officeDocument/2006/relationships" xmlns:p="http://schemas.openxmlformats.org/presentationml/2006/main">
   <p:cSld>
     <p:spTree>
       <p:nvGrpSpPr>
@@ -3916,7 +3755,7 @@
         <p:spPr/>
         <p:txBody>
           <a:bodyPr>
-            <a:normAutofit fontScale="70000" lnSpcReduction="20000"/>
+            <a:normAutofit fontScale="55000" lnSpcReduction="20000"/>
           </a:bodyPr>
           <a:lstStyle/>
           <a:p>
@@ -3948,11 +3787,7 @@
             <a:pPr lvl="1"/>
             <a:r>
               <a:rPr lang="en-US" dirty="0" smtClean="0"/>
-              <a:t>Or:</a:t>
-            </a:r>
-            <a:r>
-              <a:rPr lang="en-US" dirty="0" smtClean="0"/>
-              <a:t> ‘curved wing’ </a:t>
+              <a:t>Or: ‘curved wing’ </a:t>
             </a:r>
             <a:r>
               <a:rPr lang="en-US" dirty="0" err="1" smtClean="0"/>
@@ -3960,8 +3795,20 @@
             </a:r>
             <a:r>
               <a:rPr lang="en-US" dirty="0" smtClean="0"/>
-              <a:t> wing</a:t>
-            </a:r>
+              <a:t> </a:t>
+            </a:r>
+            <a:r>
+              <a:rPr lang="en-US" dirty="0" smtClean="0"/>
+              <a:t>wing</a:t>
+            </a:r>
+          </a:p>
+          <a:p>
+            <a:pPr lvl="1"/>
+            <a:r>
+              <a:rPr lang="en-US" dirty="0" smtClean="0"/>
+              <a:t>Entity: wing, Quality: curved</a:t>
+            </a:r>
+            <a:endParaRPr lang="en-US" dirty="0" smtClean="0"/>
           </a:p>
           <a:p>
             <a:r>
@@ -3992,11 +3839,7 @@
             <a:pPr lvl="1"/>
             <a:r>
               <a:rPr lang="en-US" dirty="0" smtClean="0"/>
-              <a:t>Or:</a:t>
-            </a:r>
-            <a:r>
-              <a:rPr lang="en-US" dirty="0" smtClean="0"/>
-              <a:t> ‘delayed kidney development’ </a:t>
+              <a:t>Or: ‘delayed kidney development’ </a:t>
             </a:r>
             <a:r>
               <a:rPr lang="en-US" dirty="0" err="1" smtClean="0"/>
@@ -4004,8 +3847,20 @@
             </a:r>
             <a:r>
               <a:rPr lang="en-US" dirty="0" smtClean="0"/>
-              <a:t> kidney development</a:t>
-            </a:r>
+              <a:t> kidney </a:t>
+            </a:r>
+            <a:r>
+              <a:rPr lang="en-US" dirty="0" smtClean="0"/>
+              <a:t>development</a:t>
+            </a:r>
+          </a:p>
+          <a:p>
+            <a:pPr lvl="1"/>
+            <a:r>
+              <a:rPr lang="en-US" dirty="0" smtClean="0"/>
+              <a:t>Entity: kidney development, Quality: delayed</a:t>
+            </a:r>
+            <a:endParaRPr lang="en-US" dirty="0" smtClean="0"/>
           </a:p>
           <a:p>
             <a:r>
@@ -4036,19 +3891,7 @@
             <a:pPr lvl="1"/>
             <a:r>
               <a:rPr lang="en-US" dirty="0" smtClean="0"/>
-              <a:t>Or:</a:t>
-            </a:r>
-            <a:r>
-              <a:rPr lang="en-US" dirty="0" smtClean="0"/>
-              <a:t> ‘temperature</a:t>
-            </a:r>
-            <a:r>
-              <a:rPr lang="en-US" dirty="0" smtClean="0"/>
-              <a:t>-dependent</a:t>
-            </a:r>
-            <a:r>
-              <a:rPr lang="en-US" dirty="0" smtClean="0"/>
-              <a:t> cell growth’ </a:t>
+              <a:t>Or: ‘temperature-dependent cell growth’ </a:t>
             </a:r>
             <a:r>
               <a:rPr lang="en-US" dirty="0" err="1" smtClean="0"/>
@@ -4056,12 +3899,65 @@
             </a:r>
             <a:r>
               <a:rPr lang="en-US" dirty="0" smtClean="0"/>
-              <a:t> </a:t>
-            </a:r>
-            <a:r>
-              <a:rPr lang="en-US" dirty="0" smtClean="0"/>
-              <a:t>cell growth (implicitly towards some growth environment)</a:t>
-            </a:r>
+              <a:t> cell </a:t>
+            </a:r>
+            <a:r>
+              <a:rPr lang="en-US" dirty="0" smtClean="0"/>
+              <a:t>growth (implicitly towards some growth environment</a:t>
+            </a:r>
+            <a:r>
+              <a:rPr lang="en-US" dirty="0" smtClean="0"/>
+              <a:t>)</a:t>
+            </a:r>
+          </a:p>
+          <a:p>
+            <a:pPr lvl="1"/>
+            <a:r>
+              <a:rPr lang="en-US" dirty="0" smtClean="0"/>
+              <a:t>Entity: cell growth, Quality: temperature dependent?</a:t>
+            </a:r>
+            <a:endParaRPr lang="en-US" dirty="0" smtClean="0"/>
+          </a:p>
+          <a:p>
+            <a:r>
+              <a:rPr lang="en-US" dirty="0" smtClean="0"/>
+              <a:t>Decreased enzyme activity</a:t>
+            </a:r>
+          </a:p>
+          <a:p>
+            <a:pPr lvl="1"/>
+            <a:r>
+              <a:rPr lang="en-US" dirty="0" err="1" smtClean="0"/>
+              <a:t>Phenotype_of</a:t>
+            </a:r>
+            <a:r>
+              <a:rPr lang="en-US" dirty="0" smtClean="0"/>
+              <a:t>  enzyme activity </a:t>
+            </a:r>
+            <a:r>
+              <a:rPr lang="en-US" dirty="0" err="1" smtClean="0"/>
+              <a:t>inheres_in</a:t>
+            </a:r>
+            <a:r>
+              <a:rPr lang="en-US" dirty="0" smtClean="0"/>
+              <a:t> some protein and </a:t>
+            </a:r>
+            <a:r>
+              <a:rPr lang="en-US" dirty="0" err="1" smtClean="0"/>
+              <a:t>has_part</a:t>
+            </a:r>
+            <a:r>
+              <a:rPr lang="en-US" dirty="0" smtClean="0"/>
+              <a:t> qualitative assessment value ‘decreased’ </a:t>
+            </a:r>
+          </a:p>
+          <a:p>
+            <a:pPr lvl="1"/>
+            <a:r>
+              <a:rPr lang="en-US" dirty="0" smtClean="0"/>
+              <a:t>Entity: enzyme activity, Quality: decreased</a:t>
+            </a:r>
+            <a:endParaRPr lang="en-US" dirty="0" smtClean="0"/>
           </a:p>
         </p:txBody>
       </p:sp>

</xml_diff>